<commit_message>
last commit, i hope
</commit_message>
<xml_diff>
--- a/Презентация Диплом.pptx
+++ b/Презентация Диплом.pptx
@@ -5280,7 +5280,7 @@
             </a:br>
             <a:r>
               <a:rPr lang="ru-RU"/>
-              <a:t>обработки сигнала</a:t>
+              <a:t>обработки сигналов</a:t>
             </a:r>
             <a:br>
               <a:rPr lang="ru-RU"/>
@@ -9346,8 +9346,8 @@
         </p:nvSpPr>
         <p:spPr bwMode="auto">
           <a:xfrm flipH="0" flipV="0">
-            <a:off x="521233" y="1249691"/>
-            <a:ext cx="7009926" cy="366119"/>
+            <a:off x="521232" y="1249690"/>
+            <a:ext cx="7130474" cy="366119"/>
           </a:xfrm>
           <a:prstGeom prst="rect">
             <a:avLst/>
@@ -9364,7 +9364,7 @@
             </a:pPr>
             <a:r>
               <a:rPr/>
-              <a:t>Реализация программного модуля обработки сигнала стандарта DMR</a:t>
+              <a:t>Реализация программного модуля обработки сигналов стандарта DMR</a:t>
             </a:r>
             <a:endParaRPr/>
           </a:p>
@@ -11986,7 +11986,7 @@
         <p:spPr bwMode="auto">
           <a:xfrm flipH="0" flipV="0">
             <a:off x="457199" y="1600695"/>
-            <a:ext cx="3369157" cy="1598619"/>
+            <a:ext cx="3369156" cy="1598619"/>
           </a:xfrm>
           <a:prstGeom prst="rect">
             <a:avLst/>
@@ -13330,7 +13330,7 @@
         </p:nvSpPr>
         <p:spPr bwMode="auto">
           <a:xfrm flipH="0" flipV="0">
-            <a:off x="3893284" y="2052689"/>
+            <a:off x="3893283" y="2052689"/>
             <a:ext cx="1007943" cy="457559"/>
           </a:xfrm>
           <a:prstGeom prst="rect">

</xml_diff>